<commit_message>
Doplnění osob, které každý slide budou prezentovat
</commit_message>
<xml_diff>
--- a/Dokumenty/Oponentura/Prezentace_oponentury_týmu_Grenade.pptx
+++ b/Dokumenty/Oponentura/Prezentace_oponentury_týmu_Grenade.pptx
@@ -3376,6 +3376,531 @@
 </p:notes>
 </file>
 
+<file path=ppt/notesSlides/notesSlide10.xml><?xml version="1.0" encoding="utf-8"?>
+<p:notes xmlns:a="http://schemas.openxmlformats.org/drawingml/2006/main" xmlns:r="http://schemas.openxmlformats.org/officeDocument/2006/relationships" xmlns:p="http://schemas.openxmlformats.org/presentationml/2006/main">
+  <p:cSld>
+    <p:spTree>
+      <p:nvGrpSpPr>
+        <p:cNvPr id="1" name=""/>
+        <p:cNvGrpSpPr/>
+        <p:nvPr/>
+      </p:nvGrpSpPr>
+      <p:grpSpPr>
+        <a:xfrm>
+          <a:off x="0" y="0"/>
+          <a:ext cx="0" cy="0"/>
+          <a:chOff x="0" y="0"/>
+          <a:chExt cx="0" cy="0"/>
+        </a:xfrm>
+      </p:grpSpPr>
+      <p:sp>
+        <p:nvSpPr>
+          <p:cNvPr id="2" name="Slide Image Placeholder 1"/>
+          <p:cNvSpPr>
+            <a:spLocks noGrp="1" noRot="1" noChangeAspect="1"/>
+          </p:cNvSpPr>
+          <p:nvPr>
+            <p:ph type="sldImg"/>
+          </p:nvPr>
+        </p:nvSpPr>
+        <p:spPr/>
+      </p:sp>
+      <p:sp>
+        <p:nvSpPr>
+          <p:cNvPr id="3" name="Notes Placeholder 2"/>
+          <p:cNvSpPr>
+            <a:spLocks noGrp="1"/>
+          </p:cNvSpPr>
+          <p:nvPr>
+            <p:ph type="body" idx="1"/>
+          </p:nvPr>
+        </p:nvSpPr>
+        <p:spPr/>
+        <p:txBody>
+          <a:bodyPr/>
+          <a:lstStyle/>
+          <a:p>
+            <a:r>
+              <a:rPr lang="cs-CZ" dirty="0"/>
+              <a:t>MNO</a:t>
+            </a:r>
+          </a:p>
+        </p:txBody>
+      </p:sp>
+      <p:sp>
+        <p:nvSpPr>
+          <p:cNvPr id="4" name="Slide Number Placeholder 3"/>
+          <p:cNvSpPr>
+            <a:spLocks noGrp="1"/>
+          </p:cNvSpPr>
+          <p:nvPr>
+            <p:ph type="sldNum" sz="quarter" idx="5"/>
+          </p:nvPr>
+        </p:nvSpPr>
+        <p:spPr/>
+        <p:txBody>
+          <a:bodyPr/>
+          <a:lstStyle/>
+          <a:p>
+            <a:fld id="{86D9740F-6449-440A-831E-15C85EF7F97E}" type="slidenum">
+              <a:rPr lang="cs-CZ" smtClean="0"/>
+              <a:t>10</a:t>
+            </a:fld>
+            <a:endParaRPr lang="cs-CZ"/>
+          </a:p>
+        </p:txBody>
+      </p:sp>
+    </p:spTree>
+    <p:extLst>
+      <p:ext uri="{BB962C8B-B14F-4D97-AF65-F5344CB8AC3E}">
+        <p14:creationId xmlns:p14="http://schemas.microsoft.com/office/powerpoint/2010/main" val="588624398"/>
+      </p:ext>
+    </p:extLst>
+  </p:cSld>
+  <p:clrMapOvr>
+    <a:masterClrMapping/>
+  </p:clrMapOvr>
+</p:notes>
+</file>
+
+<file path=ppt/notesSlides/notesSlide11.xml><?xml version="1.0" encoding="utf-8"?>
+<p:notes xmlns:a="http://schemas.openxmlformats.org/drawingml/2006/main" xmlns:r="http://schemas.openxmlformats.org/officeDocument/2006/relationships" xmlns:p="http://schemas.openxmlformats.org/presentationml/2006/main">
+  <p:cSld>
+    <p:spTree>
+      <p:nvGrpSpPr>
+        <p:cNvPr id="1" name=""/>
+        <p:cNvGrpSpPr/>
+        <p:nvPr/>
+      </p:nvGrpSpPr>
+      <p:grpSpPr>
+        <a:xfrm>
+          <a:off x="0" y="0"/>
+          <a:ext cx="0" cy="0"/>
+          <a:chOff x="0" y="0"/>
+          <a:chExt cx="0" cy="0"/>
+        </a:xfrm>
+      </p:grpSpPr>
+      <p:sp>
+        <p:nvSpPr>
+          <p:cNvPr id="2" name="Slide Image Placeholder 1"/>
+          <p:cNvSpPr>
+            <a:spLocks noGrp="1" noRot="1" noChangeAspect="1"/>
+          </p:cNvSpPr>
+          <p:nvPr>
+            <p:ph type="sldImg"/>
+          </p:nvPr>
+        </p:nvSpPr>
+        <p:spPr/>
+      </p:sp>
+      <p:sp>
+        <p:nvSpPr>
+          <p:cNvPr id="3" name="Notes Placeholder 2"/>
+          <p:cNvSpPr>
+            <a:spLocks noGrp="1"/>
+          </p:cNvSpPr>
+          <p:nvPr>
+            <p:ph type="body" idx="1"/>
+          </p:nvPr>
+        </p:nvSpPr>
+        <p:spPr/>
+        <p:txBody>
+          <a:bodyPr/>
+          <a:lstStyle/>
+          <a:p>
+            <a:r>
+              <a:rPr lang="cs-CZ" dirty="0"/>
+              <a:t>MNO</a:t>
+            </a:r>
+          </a:p>
+        </p:txBody>
+      </p:sp>
+      <p:sp>
+        <p:nvSpPr>
+          <p:cNvPr id="4" name="Slide Number Placeholder 3"/>
+          <p:cNvSpPr>
+            <a:spLocks noGrp="1"/>
+          </p:cNvSpPr>
+          <p:nvPr>
+            <p:ph type="sldNum" sz="quarter" idx="5"/>
+          </p:nvPr>
+        </p:nvSpPr>
+        <p:spPr/>
+        <p:txBody>
+          <a:bodyPr/>
+          <a:lstStyle/>
+          <a:p>
+            <a:fld id="{86D9740F-6449-440A-831E-15C85EF7F97E}" type="slidenum">
+              <a:rPr lang="cs-CZ" smtClean="0"/>
+              <a:t>11</a:t>
+            </a:fld>
+            <a:endParaRPr lang="cs-CZ"/>
+          </a:p>
+        </p:txBody>
+      </p:sp>
+    </p:spTree>
+    <p:extLst>
+      <p:ext uri="{BB962C8B-B14F-4D97-AF65-F5344CB8AC3E}">
+        <p14:creationId xmlns:p14="http://schemas.microsoft.com/office/powerpoint/2010/main" val="2309895251"/>
+      </p:ext>
+    </p:extLst>
+  </p:cSld>
+  <p:clrMapOvr>
+    <a:masterClrMapping/>
+  </p:clrMapOvr>
+</p:notes>
+</file>
+
+<file path=ppt/notesSlides/notesSlide12.xml><?xml version="1.0" encoding="utf-8"?>
+<p:notes xmlns:a="http://schemas.openxmlformats.org/drawingml/2006/main" xmlns:r="http://schemas.openxmlformats.org/officeDocument/2006/relationships" xmlns:p="http://schemas.openxmlformats.org/presentationml/2006/main">
+  <p:cSld>
+    <p:spTree>
+      <p:nvGrpSpPr>
+        <p:cNvPr id="1" name=""/>
+        <p:cNvGrpSpPr/>
+        <p:nvPr/>
+      </p:nvGrpSpPr>
+      <p:grpSpPr>
+        <a:xfrm>
+          <a:off x="0" y="0"/>
+          <a:ext cx="0" cy="0"/>
+          <a:chOff x="0" y="0"/>
+          <a:chExt cx="0" cy="0"/>
+        </a:xfrm>
+      </p:grpSpPr>
+      <p:sp>
+        <p:nvSpPr>
+          <p:cNvPr id="2" name="Slide Image Placeholder 1"/>
+          <p:cNvSpPr>
+            <a:spLocks noGrp="1" noRot="1" noChangeAspect="1"/>
+          </p:cNvSpPr>
+          <p:nvPr>
+            <p:ph type="sldImg"/>
+          </p:nvPr>
+        </p:nvSpPr>
+        <p:spPr/>
+      </p:sp>
+      <p:sp>
+        <p:nvSpPr>
+          <p:cNvPr id="3" name="Notes Placeholder 2"/>
+          <p:cNvSpPr>
+            <a:spLocks noGrp="1"/>
+          </p:cNvSpPr>
+          <p:nvPr>
+            <p:ph type="body" idx="1"/>
+          </p:nvPr>
+        </p:nvSpPr>
+        <p:spPr/>
+        <p:txBody>
+          <a:bodyPr/>
+          <a:lstStyle/>
+          <a:p>
+            <a:r>
+              <a:rPr lang="cs-CZ" dirty="0"/>
+              <a:t>ŠPE</a:t>
+            </a:r>
+          </a:p>
+        </p:txBody>
+      </p:sp>
+      <p:sp>
+        <p:nvSpPr>
+          <p:cNvPr id="4" name="Slide Number Placeholder 3"/>
+          <p:cNvSpPr>
+            <a:spLocks noGrp="1"/>
+          </p:cNvSpPr>
+          <p:nvPr>
+            <p:ph type="sldNum" sz="quarter" idx="5"/>
+          </p:nvPr>
+        </p:nvSpPr>
+        <p:spPr/>
+        <p:txBody>
+          <a:bodyPr/>
+          <a:lstStyle/>
+          <a:p>
+            <a:fld id="{86D9740F-6449-440A-831E-15C85EF7F97E}" type="slidenum">
+              <a:rPr lang="cs-CZ" smtClean="0"/>
+              <a:t>12</a:t>
+            </a:fld>
+            <a:endParaRPr lang="cs-CZ"/>
+          </a:p>
+        </p:txBody>
+      </p:sp>
+    </p:spTree>
+    <p:extLst>
+      <p:ext uri="{BB962C8B-B14F-4D97-AF65-F5344CB8AC3E}">
+        <p14:creationId xmlns:p14="http://schemas.microsoft.com/office/powerpoint/2010/main" val="1223697069"/>
+      </p:ext>
+    </p:extLst>
+  </p:cSld>
+  <p:clrMapOvr>
+    <a:masterClrMapping/>
+  </p:clrMapOvr>
+</p:notes>
+</file>
+
+<file path=ppt/notesSlides/notesSlide13.xml><?xml version="1.0" encoding="utf-8"?>
+<p:notes xmlns:a="http://schemas.openxmlformats.org/drawingml/2006/main" xmlns:r="http://schemas.openxmlformats.org/officeDocument/2006/relationships" xmlns:p="http://schemas.openxmlformats.org/presentationml/2006/main">
+  <p:cSld>
+    <p:spTree>
+      <p:nvGrpSpPr>
+        <p:cNvPr id="1" name=""/>
+        <p:cNvGrpSpPr/>
+        <p:nvPr/>
+      </p:nvGrpSpPr>
+      <p:grpSpPr>
+        <a:xfrm>
+          <a:off x="0" y="0"/>
+          <a:ext cx="0" cy="0"/>
+          <a:chOff x="0" y="0"/>
+          <a:chExt cx="0" cy="0"/>
+        </a:xfrm>
+      </p:grpSpPr>
+      <p:sp>
+        <p:nvSpPr>
+          <p:cNvPr id="2" name="Slide Image Placeholder 1"/>
+          <p:cNvSpPr>
+            <a:spLocks noGrp="1" noRot="1" noChangeAspect="1"/>
+          </p:cNvSpPr>
+          <p:nvPr>
+            <p:ph type="sldImg"/>
+          </p:nvPr>
+        </p:nvSpPr>
+        <p:spPr/>
+      </p:sp>
+      <p:sp>
+        <p:nvSpPr>
+          <p:cNvPr id="3" name="Notes Placeholder 2"/>
+          <p:cNvSpPr>
+            <a:spLocks noGrp="1"/>
+          </p:cNvSpPr>
+          <p:nvPr>
+            <p:ph type="body" idx="1"/>
+          </p:nvPr>
+        </p:nvSpPr>
+        <p:spPr/>
+        <p:txBody>
+          <a:bodyPr/>
+          <a:lstStyle/>
+          <a:p>
+            <a:r>
+              <a:rPr lang="cs-CZ" dirty="0"/>
+              <a:t>ŠPE</a:t>
+            </a:r>
+          </a:p>
+          <a:p>
+            <a:endParaRPr lang="cs-CZ" dirty="0"/>
+          </a:p>
+        </p:txBody>
+      </p:sp>
+      <p:sp>
+        <p:nvSpPr>
+          <p:cNvPr id="4" name="Slide Number Placeholder 3"/>
+          <p:cNvSpPr>
+            <a:spLocks noGrp="1"/>
+          </p:cNvSpPr>
+          <p:nvPr>
+            <p:ph type="sldNum" sz="quarter" idx="5"/>
+          </p:nvPr>
+        </p:nvSpPr>
+        <p:spPr/>
+        <p:txBody>
+          <a:bodyPr/>
+          <a:lstStyle/>
+          <a:p>
+            <a:fld id="{86D9740F-6449-440A-831E-15C85EF7F97E}" type="slidenum">
+              <a:rPr lang="cs-CZ" smtClean="0"/>
+              <a:t>13</a:t>
+            </a:fld>
+            <a:endParaRPr lang="cs-CZ"/>
+          </a:p>
+        </p:txBody>
+      </p:sp>
+    </p:spTree>
+    <p:extLst>
+      <p:ext uri="{BB962C8B-B14F-4D97-AF65-F5344CB8AC3E}">
+        <p14:creationId xmlns:p14="http://schemas.microsoft.com/office/powerpoint/2010/main" val="1366135173"/>
+      </p:ext>
+    </p:extLst>
+  </p:cSld>
+  <p:clrMapOvr>
+    <a:masterClrMapping/>
+  </p:clrMapOvr>
+</p:notes>
+</file>
+
+<file path=ppt/notesSlides/notesSlide14.xml><?xml version="1.0" encoding="utf-8"?>
+<p:notes xmlns:a="http://schemas.openxmlformats.org/drawingml/2006/main" xmlns:r="http://schemas.openxmlformats.org/officeDocument/2006/relationships" xmlns:p="http://schemas.openxmlformats.org/presentationml/2006/main">
+  <p:cSld>
+    <p:spTree>
+      <p:nvGrpSpPr>
+        <p:cNvPr id="1" name=""/>
+        <p:cNvGrpSpPr/>
+        <p:nvPr/>
+      </p:nvGrpSpPr>
+      <p:grpSpPr>
+        <a:xfrm>
+          <a:off x="0" y="0"/>
+          <a:ext cx="0" cy="0"/>
+          <a:chOff x="0" y="0"/>
+          <a:chExt cx="0" cy="0"/>
+        </a:xfrm>
+      </p:grpSpPr>
+      <p:sp>
+        <p:nvSpPr>
+          <p:cNvPr id="2" name="Slide Image Placeholder 1"/>
+          <p:cNvSpPr>
+            <a:spLocks noGrp="1" noRot="1" noChangeAspect="1"/>
+          </p:cNvSpPr>
+          <p:nvPr>
+            <p:ph type="sldImg"/>
+          </p:nvPr>
+        </p:nvSpPr>
+        <p:spPr/>
+      </p:sp>
+      <p:sp>
+        <p:nvSpPr>
+          <p:cNvPr id="3" name="Notes Placeholder 2"/>
+          <p:cNvSpPr>
+            <a:spLocks noGrp="1"/>
+          </p:cNvSpPr>
+          <p:nvPr>
+            <p:ph type="body" idx="1"/>
+          </p:nvPr>
+        </p:nvSpPr>
+        <p:spPr/>
+        <p:txBody>
+          <a:bodyPr/>
+          <a:lstStyle/>
+          <a:p>
+            <a:r>
+              <a:rPr lang="cs-CZ" dirty="0"/>
+              <a:t>JŠT</a:t>
+            </a:r>
+          </a:p>
+        </p:txBody>
+      </p:sp>
+      <p:sp>
+        <p:nvSpPr>
+          <p:cNvPr id="4" name="Slide Number Placeholder 3"/>
+          <p:cNvSpPr>
+            <a:spLocks noGrp="1"/>
+          </p:cNvSpPr>
+          <p:nvPr>
+            <p:ph type="sldNum" sz="quarter" idx="5"/>
+          </p:nvPr>
+        </p:nvSpPr>
+        <p:spPr/>
+        <p:txBody>
+          <a:bodyPr/>
+          <a:lstStyle/>
+          <a:p>
+            <a:fld id="{86D9740F-6449-440A-831E-15C85EF7F97E}" type="slidenum">
+              <a:rPr lang="cs-CZ" smtClean="0"/>
+              <a:t>14</a:t>
+            </a:fld>
+            <a:endParaRPr lang="cs-CZ"/>
+          </a:p>
+        </p:txBody>
+      </p:sp>
+    </p:spTree>
+    <p:extLst>
+      <p:ext uri="{BB962C8B-B14F-4D97-AF65-F5344CB8AC3E}">
+        <p14:creationId xmlns:p14="http://schemas.microsoft.com/office/powerpoint/2010/main" val="3277585473"/>
+      </p:ext>
+    </p:extLst>
+  </p:cSld>
+  <p:clrMapOvr>
+    <a:masterClrMapping/>
+  </p:clrMapOvr>
+</p:notes>
+</file>
+
+<file path=ppt/notesSlides/notesSlide15.xml><?xml version="1.0" encoding="utf-8"?>
+<p:notes xmlns:a="http://schemas.openxmlformats.org/drawingml/2006/main" xmlns:r="http://schemas.openxmlformats.org/officeDocument/2006/relationships" xmlns:p="http://schemas.openxmlformats.org/presentationml/2006/main">
+  <p:cSld>
+    <p:spTree>
+      <p:nvGrpSpPr>
+        <p:cNvPr id="1" name=""/>
+        <p:cNvGrpSpPr/>
+        <p:nvPr/>
+      </p:nvGrpSpPr>
+      <p:grpSpPr>
+        <a:xfrm>
+          <a:off x="0" y="0"/>
+          <a:ext cx="0" cy="0"/>
+          <a:chOff x="0" y="0"/>
+          <a:chExt cx="0" cy="0"/>
+        </a:xfrm>
+      </p:grpSpPr>
+      <p:sp>
+        <p:nvSpPr>
+          <p:cNvPr id="2" name="Slide Image Placeholder 1"/>
+          <p:cNvSpPr>
+            <a:spLocks noGrp="1" noRot="1" noChangeAspect="1"/>
+          </p:cNvSpPr>
+          <p:nvPr>
+            <p:ph type="sldImg"/>
+          </p:nvPr>
+        </p:nvSpPr>
+        <p:spPr/>
+      </p:sp>
+      <p:sp>
+        <p:nvSpPr>
+          <p:cNvPr id="3" name="Notes Placeholder 2"/>
+          <p:cNvSpPr>
+            <a:spLocks noGrp="1"/>
+          </p:cNvSpPr>
+          <p:nvPr>
+            <p:ph type="body" idx="1"/>
+          </p:nvPr>
+        </p:nvSpPr>
+        <p:spPr/>
+        <p:txBody>
+          <a:bodyPr/>
+          <a:lstStyle/>
+          <a:p>
+            <a:r>
+              <a:rPr lang="cs-CZ" dirty="0"/>
+              <a:t>JŠT</a:t>
+            </a:r>
+          </a:p>
+        </p:txBody>
+      </p:sp>
+      <p:sp>
+        <p:nvSpPr>
+          <p:cNvPr id="4" name="Slide Number Placeholder 3"/>
+          <p:cNvSpPr>
+            <a:spLocks noGrp="1"/>
+          </p:cNvSpPr>
+          <p:nvPr>
+            <p:ph type="sldNum" sz="quarter" idx="5"/>
+          </p:nvPr>
+        </p:nvSpPr>
+        <p:spPr/>
+        <p:txBody>
+          <a:bodyPr/>
+          <a:lstStyle/>
+          <a:p>
+            <a:fld id="{86D9740F-6449-440A-831E-15C85EF7F97E}" type="slidenum">
+              <a:rPr lang="cs-CZ" smtClean="0"/>
+              <a:t>15</a:t>
+            </a:fld>
+            <a:endParaRPr lang="cs-CZ"/>
+          </a:p>
+        </p:txBody>
+      </p:sp>
+    </p:spTree>
+    <p:extLst>
+      <p:ext uri="{BB962C8B-B14F-4D97-AF65-F5344CB8AC3E}">
+        <p14:creationId xmlns:p14="http://schemas.microsoft.com/office/powerpoint/2010/main" val="2579530335"/>
+      </p:ext>
+    </p:extLst>
+  </p:cSld>
+  <p:clrMapOvr>
+    <a:masterClrMapping/>
+  </p:clrMapOvr>
+</p:notes>
+</file>
+
 <file path=ppt/notesSlides/notesSlide2.xml><?xml version="1.0" encoding="utf-8"?>
 <p:notes xmlns:a="http://schemas.openxmlformats.org/drawingml/2006/main" xmlns:r="http://schemas.openxmlformats.org/officeDocument/2006/relationships" xmlns:p="http://schemas.openxmlformats.org/presentationml/2006/main">
   <p:cSld>
@@ -3504,7 +4029,10 @@
           <a:bodyPr/>
           <a:lstStyle/>
           <a:p>
-            <a:endParaRPr lang="cs-CZ" dirty="0"/>
+            <a:r>
+              <a:rPr lang="cs-CZ" dirty="0"/>
+              <a:t>BFI</a:t>
+            </a:r>
           </a:p>
         </p:txBody>
       </p:sp>
@@ -3588,7 +4116,10 @@
           <a:bodyPr/>
           <a:lstStyle/>
           <a:p>
-            <a:endParaRPr lang="cs-CZ" dirty="0"/>
+            <a:r>
+              <a:rPr lang="cs-CZ" dirty="0"/>
+              <a:t>BFI</a:t>
+            </a:r>
           </a:p>
         </p:txBody>
       </p:sp>
@@ -3672,7 +4203,10 @@
           <a:bodyPr/>
           <a:lstStyle/>
           <a:p>
-            <a:endParaRPr lang="cs-CZ" dirty="0"/>
+            <a:r>
+              <a:rPr lang="cs-CZ" dirty="0"/>
+              <a:t>BFI</a:t>
+            </a:r>
           </a:p>
         </p:txBody>
       </p:sp>
@@ -3756,7 +4290,10 @@
           <a:bodyPr/>
           <a:lstStyle/>
           <a:p>
-            <a:endParaRPr lang="cs-CZ" dirty="0"/>
+            <a:r>
+              <a:rPr lang="cs-CZ" dirty="0"/>
+              <a:t>BFI</a:t>
+            </a:r>
           </a:p>
         </p:txBody>
       </p:sp>
@@ -3840,7 +4377,10 @@
           <a:bodyPr/>
           <a:lstStyle/>
           <a:p>
-            <a:endParaRPr lang="cs-CZ" dirty="0"/>
+            <a:r>
+              <a:rPr lang="cs-CZ" dirty="0"/>
+              <a:t>LRA</a:t>
+            </a:r>
           </a:p>
         </p:txBody>
       </p:sp>
@@ -3871,6 +4411,180 @@
     <p:extLst>
       <p:ext uri="{BB962C8B-B14F-4D97-AF65-F5344CB8AC3E}">
         <p14:creationId xmlns:p14="http://schemas.microsoft.com/office/powerpoint/2010/main" val="3521678078"/>
+      </p:ext>
+    </p:extLst>
+  </p:cSld>
+  <p:clrMapOvr>
+    <a:masterClrMapping/>
+  </p:clrMapOvr>
+</p:notes>
+</file>
+
+<file path=ppt/notesSlides/notesSlide8.xml><?xml version="1.0" encoding="utf-8"?>
+<p:notes xmlns:a="http://schemas.openxmlformats.org/drawingml/2006/main" xmlns:r="http://schemas.openxmlformats.org/officeDocument/2006/relationships" xmlns:p="http://schemas.openxmlformats.org/presentationml/2006/main">
+  <p:cSld>
+    <p:spTree>
+      <p:nvGrpSpPr>
+        <p:cNvPr id="1" name=""/>
+        <p:cNvGrpSpPr/>
+        <p:nvPr/>
+      </p:nvGrpSpPr>
+      <p:grpSpPr>
+        <a:xfrm>
+          <a:off x="0" y="0"/>
+          <a:ext cx="0" cy="0"/>
+          <a:chOff x="0" y="0"/>
+          <a:chExt cx="0" cy="0"/>
+        </a:xfrm>
+      </p:grpSpPr>
+      <p:sp>
+        <p:nvSpPr>
+          <p:cNvPr id="2" name="Slide Image Placeholder 1"/>
+          <p:cNvSpPr>
+            <a:spLocks noGrp="1" noRot="1" noChangeAspect="1"/>
+          </p:cNvSpPr>
+          <p:nvPr>
+            <p:ph type="sldImg"/>
+          </p:nvPr>
+        </p:nvSpPr>
+        <p:spPr/>
+      </p:sp>
+      <p:sp>
+        <p:nvSpPr>
+          <p:cNvPr id="3" name="Notes Placeholder 2"/>
+          <p:cNvSpPr>
+            <a:spLocks noGrp="1"/>
+          </p:cNvSpPr>
+          <p:nvPr>
+            <p:ph type="body" idx="1"/>
+          </p:nvPr>
+        </p:nvSpPr>
+        <p:spPr/>
+        <p:txBody>
+          <a:bodyPr/>
+          <a:lstStyle/>
+          <a:p>
+            <a:r>
+              <a:rPr lang="cs-CZ" dirty="0"/>
+              <a:t>JSE</a:t>
+            </a:r>
+          </a:p>
+        </p:txBody>
+      </p:sp>
+      <p:sp>
+        <p:nvSpPr>
+          <p:cNvPr id="4" name="Slide Number Placeholder 3"/>
+          <p:cNvSpPr>
+            <a:spLocks noGrp="1"/>
+          </p:cNvSpPr>
+          <p:nvPr>
+            <p:ph type="sldNum" sz="quarter" idx="5"/>
+          </p:nvPr>
+        </p:nvSpPr>
+        <p:spPr/>
+        <p:txBody>
+          <a:bodyPr/>
+          <a:lstStyle/>
+          <a:p>
+            <a:fld id="{86D9740F-6449-440A-831E-15C85EF7F97E}" type="slidenum">
+              <a:rPr lang="cs-CZ" smtClean="0"/>
+              <a:t>8</a:t>
+            </a:fld>
+            <a:endParaRPr lang="cs-CZ"/>
+          </a:p>
+        </p:txBody>
+      </p:sp>
+    </p:spTree>
+    <p:extLst>
+      <p:ext uri="{BB962C8B-B14F-4D97-AF65-F5344CB8AC3E}">
+        <p14:creationId xmlns:p14="http://schemas.microsoft.com/office/powerpoint/2010/main" val="743814336"/>
+      </p:ext>
+    </p:extLst>
+  </p:cSld>
+  <p:clrMapOvr>
+    <a:masterClrMapping/>
+  </p:clrMapOvr>
+</p:notes>
+</file>
+
+<file path=ppt/notesSlides/notesSlide9.xml><?xml version="1.0" encoding="utf-8"?>
+<p:notes xmlns:a="http://schemas.openxmlformats.org/drawingml/2006/main" xmlns:r="http://schemas.openxmlformats.org/officeDocument/2006/relationships" xmlns:p="http://schemas.openxmlformats.org/presentationml/2006/main">
+  <p:cSld>
+    <p:spTree>
+      <p:nvGrpSpPr>
+        <p:cNvPr id="1" name=""/>
+        <p:cNvGrpSpPr/>
+        <p:nvPr/>
+      </p:nvGrpSpPr>
+      <p:grpSpPr>
+        <a:xfrm>
+          <a:off x="0" y="0"/>
+          <a:ext cx="0" cy="0"/>
+          <a:chOff x="0" y="0"/>
+          <a:chExt cx="0" cy="0"/>
+        </a:xfrm>
+      </p:grpSpPr>
+      <p:sp>
+        <p:nvSpPr>
+          <p:cNvPr id="2" name="Slide Image Placeholder 1"/>
+          <p:cNvSpPr>
+            <a:spLocks noGrp="1" noRot="1" noChangeAspect="1"/>
+          </p:cNvSpPr>
+          <p:nvPr>
+            <p:ph type="sldImg"/>
+          </p:nvPr>
+        </p:nvSpPr>
+        <p:spPr/>
+      </p:sp>
+      <p:sp>
+        <p:nvSpPr>
+          <p:cNvPr id="3" name="Notes Placeholder 2"/>
+          <p:cNvSpPr>
+            <a:spLocks noGrp="1"/>
+          </p:cNvSpPr>
+          <p:nvPr>
+            <p:ph type="body" idx="1"/>
+          </p:nvPr>
+        </p:nvSpPr>
+        <p:spPr/>
+        <p:txBody>
+          <a:bodyPr/>
+          <a:lstStyle/>
+          <a:p>
+            <a:r>
+              <a:rPr lang="cs-CZ" dirty="0"/>
+              <a:t>MNO</a:t>
+            </a:r>
+          </a:p>
+        </p:txBody>
+      </p:sp>
+      <p:sp>
+        <p:nvSpPr>
+          <p:cNvPr id="4" name="Slide Number Placeholder 3"/>
+          <p:cNvSpPr>
+            <a:spLocks noGrp="1"/>
+          </p:cNvSpPr>
+          <p:nvPr>
+            <p:ph type="sldNum" sz="quarter" idx="5"/>
+          </p:nvPr>
+        </p:nvSpPr>
+        <p:spPr/>
+        <p:txBody>
+          <a:bodyPr/>
+          <a:lstStyle/>
+          <a:p>
+            <a:fld id="{86D9740F-6449-440A-831E-15C85EF7F97E}" type="slidenum">
+              <a:rPr lang="cs-CZ" smtClean="0"/>
+              <a:t>9</a:t>
+            </a:fld>
+            <a:endParaRPr lang="cs-CZ"/>
+          </a:p>
+        </p:txBody>
+      </p:sp>
+    </p:spTree>
+    <p:extLst>
+      <p:ext uri="{BB962C8B-B14F-4D97-AF65-F5344CB8AC3E}">
+        <p14:creationId xmlns:p14="http://schemas.microsoft.com/office/powerpoint/2010/main" val="747096177"/>
       </p:ext>
     </p:extLst>
   </p:cSld>
@@ -17113,7 +17827,7 @@
           <p:nvPr/>
         </p:nvPicPr>
         <p:blipFill>
-          <a:blip r:embed="rId2"/>
+          <a:blip r:embed="rId3"/>
           <a:stretch>
             <a:fillRect/>
           </a:stretch>
@@ -17143,7 +17857,7 @@
           <p:nvPr/>
         </p:nvPicPr>
         <p:blipFill>
-          <a:blip r:embed="rId3"/>
+          <a:blip r:embed="rId4"/>
           <a:stretch>
             <a:fillRect/>
           </a:stretch>
@@ -17257,7 +17971,7 @@
           <p:nvPr/>
         </p:nvPicPr>
         <p:blipFill>
-          <a:blip r:embed="rId2">
+          <a:blip r:embed="rId3">
             <a:extLst>
               <a:ext uri="{28A0092B-C50C-407E-A947-70E740481C1C}">
                 <a14:useLocalDpi xmlns:a14="http://schemas.microsoft.com/office/drawing/2010/main" val="0"/>
@@ -18514,7 +19228,7 @@
           <p:nvPr/>
         </p:nvPicPr>
         <p:blipFill>
-          <a:blip r:embed="rId2"/>
+          <a:blip r:embed="rId3"/>
           <a:stretch>
             <a:fillRect/>
           </a:stretch>
@@ -18544,7 +19258,7 @@
           <p:nvPr/>
         </p:nvPicPr>
         <p:blipFill>
-          <a:blip r:embed="rId3"/>
+          <a:blip r:embed="rId4"/>
           <a:stretch>
             <a:fillRect/>
           </a:stretch>
@@ -18658,7 +19372,7 @@
               <a:avLst/>
             </a:prstGeom>
             <a:blipFill>
-              <a:blip r:embed="rId2">
+              <a:blip r:embed="rId3">
                 <a:duotone>
                   <a:schemeClr val="dk2">
                     <a:shade val="69000"/>
@@ -19431,7 +20145,7 @@
                   <a:schemeClr val="tx2"/>
                 </a:solidFill>
               </a:rPr>
-              <a:t>Celkový dojem z aplikae je dobrý, pro finální fázi vývoje doporučujeme doplnit chybějící funkcionalitu a odstranit chyby.</a:t>
+              <a:t>Celkový dojem z aplikace je dobrý, pro finální fázi vývoje doporučujeme doplnit chybějící funkcionalitu a odstranit chyby.</a:t>
             </a:r>
             <a:endParaRPr lang="en-US" sz="2400" dirty="0">
               <a:solidFill>
@@ -23532,7 +24246,7 @@
           <p:nvPr/>
         </p:nvPicPr>
         <p:blipFill>
-          <a:blip r:embed="rId2"/>
+          <a:blip r:embed="rId3"/>
           <a:stretch>
             <a:fillRect/>
           </a:stretch>
@@ -24769,21 +25483,6 @@
 </file>
 
 <file path=customXml/item1.xml><?xml version="1.0" encoding="utf-8"?>
-<p:properties xmlns:p="http://schemas.microsoft.com/office/2006/metadata/properties" xmlns:xsi="http://www.w3.org/2001/XMLSchema-instance" xmlns:pc="http://schemas.microsoft.com/office/infopath/2007/PartnerControls">
-  <documentManagement/>
-</p:properties>
-</file>
-
-<file path=customXml/item2.xml><?xml version="1.0" encoding="utf-8"?>
-<?mso-contentType ?>
-<FormTemplates xmlns="http://schemas.microsoft.com/sharepoint/v3/contenttype/forms">
-  <Display>DocumentLibraryForm</Display>
-  <Edit>DocumentLibraryForm</Edit>
-  <New>DocumentLibraryForm</New>
-</FormTemplates>
-</file>
-
-<file path=customXml/item3.xml><?xml version="1.0" encoding="utf-8"?>
 <ct:contentTypeSchema xmlns:ct="http://schemas.microsoft.com/office/2006/metadata/contentType" xmlns:ma="http://schemas.microsoft.com/office/2006/metadata/properties/metaAttributes" ct:_="" ma:_="" ma:contentTypeName="Dokument" ma:contentTypeID="0x0101004F7B6DC845F01641AC1819E233C32348" ma:contentTypeVersion="6" ma:contentTypeDescription="Vytvoří nový dokument" ma:contentTypeScope="" ma:versionID="195fb975806c9b71bd4db80fda2f3649">
   <xsd:schema xmlns:xsd="http://www.w3.org/2001/XMLSchema" xmlns:xs="http://www.w3.org/2001/XMLSchema" xmlns:p="http://schemas.microsoft.com/office/2006/metadata/properties" xmlns:ns2="257ed0fd-0c01-4892-a7d0-e889d1c5a7c5" targetNamespace="http://schemas.microsoft.com/office/2006/metadata/properties" ma:root="true" ma:fieldsID="3a9d68afe9b8dca9cb99d9d19d8e5dc9" ns2:_="">
     <xsd:import namespace="257ed0fd-0c01-4892-a7d0-e889d1c5a7c5"/>
@@ -24941,31 +25640,22 @@
 </ct:contentTypeSchema>
 </file>
 
-<file path=customXml/itemProps1.xml><?xml version="1.0" encoding="utf-8"?>
-<ds:datastoreItem xmlns:ds="http://schemas.openxmlformats.org/officeDocument/2006/customXml" ds:itemID="{4F262821-1748-4F4A-A019-FF8570657BBF}">
-  <ds:schemaRefs>
-    <ds:schemaRef ds:uri="http://purl.org/dc/elements/1.1/"/>
-    <ds:schemaRef ds:uri="http://schemas.microsoft.com/office/2006/documentManagement/types"/>
-    <ds:schemaRef ds:uri="http://schemas.microsoft.com/office/2006/metadata/properties"/>
-    <ds:schemaRef ds:uri="http://purl.org/dc/terms/"/>
-    <ds:schemaRef ds:uri="http://www.w3.org/XML/1998/namespace"/>
-    <ds:schemaRef ds:uri="http://purl.org/dc/dcmitype/"/>
-    <ds:schemaRef ds:uri="http://schemas.microsoft.com/office/infopath/2007/PartnerControls"/>
-    <ds:schemaRef ds:uri="http://schemas.openxmlformats.org/package/2006/metadata/core-properties"/>
-    <ds:schemaRef ds:uri="257ed0fd-0c01-4892-a7d0-e889d1c5a7c5"/>
-  </ds:schemaRefs>
-</ds:datastoreItem>
+<file path=customXml/item2.xml><?xml version="1.0" encoding="utf-8"?>
+<?mso-contentType ?>
+<FormTemplates xmlns="http://schemas.microsoft.com/sharepoint/v3/contenttype/forms">
+  <Display>DocumentLibraryForm</Display>
+  <Edit>DocumentLibraryForm</Edit>
+  <New>DocumentLibraryForm</New>
+</FormTemplates>
 </file>
 
-<file path=customXml/itemProps2.xml><?xml version="1.0" encoding="utf-8"?>
-<ds:datastoreItem xmlns:ds="http://schemas.openxmlformats.org/officeDocument/2006/customXml" ds:itemID="{EF1775FF-F968-4A9D-A592-B197FE2C9752}">
-  <ds:schemaRefs>
-    <ds:schemaRef ds:uri="http://schemas.microsoft.com/sharepoint/v3/contenttype/forms"/>
-  </ds:schemaRefs>
-</ds:datastoreItem>
+<file path=customXml/item3.xml><?xml version="1.0" encoding="utf-8"?>
+<p:properties xmlns:p="http://schemas.microsoft.com/office/2006/metadata/properties" xmlns:xsi="http://www.w3.org/2001/XMLSchema-instance" xmlns:pc="http://schemas.microsoft.com/office/infopath/2007/PartnerControls">
+  <documentManagement/>
+</p:properties>
 </file>
 
-<file path=customXml/itemProps3.xml><?xml version="1.0" encoding="utf-8"?>
+<file path=customXml/itemProps1.xml><?xml version="1.0" encoding="utf-8"?>
 <ds:datastoreItem xmlns:ds="http://schemas.openxmlformats.org/officeDocument/2006/customXml" ds:itemID="{97743DC1-F4DF-4733-97EA-774782C6BC42}">
   <ds:schemaRefs>
     <ds:schemaRef ds:uri="http://schemas.microsoft.com/office/2006/metadata/contentType"/>
@@ -24981,4 +25671,28 @@
     <ds:schemaRef ds:uri="http://schemas.microsoft.com/internal/obd"/>
   </ds:schemaRefs>
 </ds:datastoreItem>
+</file>
+
+<file path=customXml/itemProps2.xml><?xml version="1.0" encoding="utf-8"?>
+<ds:datastoreItem xmlns:ds="http://schemas.openxmlformats.org/officeDocument/2006/customXml" ds:itemID="{EF1775FF-F968-4A9D-A592-B197FE2C9752}">
+  <ds:schemaRefs>
+    <ds:schemaRef ds:uri="http://schemas.microsoft.com/sharepoint/v3/contenttype/forms"/>
+  </ds:schemaRefs>
+</ds:datastoreItem>
+</file>
+
+<file path=customXml/itemProps3.xml><?xml version="1.0" encoding="utf-8"?>
+<ds:datastoreItem xmlns:ds="http://schemas.openxmlformats.org/officeDocument/2006/customXml" ds:itemID="{4F262821-1748-4F4A-A019-FF8570657BBF}">
+  <ds:schemaRefs>
+    <ds:schemaRef ds:uri="http://purl.org/dc/elements/1.1/"/>
+    <ds:schemaRef ds:uri="http://schemas.microsoft.com/office/2006/documentManagement/types"/>
+    <ds:schemaRef ds:uri="http://schemas.microsoft.com/office/2006/metadata/properties"/>
+    <ds:schemaRef ds:uri="http://purl.org/dc/terms/"/>
+    <ds:schemaRef ds:uri="http://www.w3.org/XML/1998/namespace"/>
+    <ds:schemaRef ds:uri="http://purl.org/dc/dcmitype/"/>
+    <ds:schemaRef ds:uri="http://schemas.microsoft.com/office/infopath/2007/PartnerControls"/>
+    <ds:schemaRef ds:uri="http://schemas.openxmlformats.org/package/2006/metadata/core-properties"/>
+    <ds:schemaRef ds:uri="257ed0fd-0c01-4892-a7d0-e889d1c5a7c5"/>
+  </ds:schemaRefs>
+</ds:datastoreItem>
 </file>
</xml_diff>